<commit_message>
updated non-technical presentation slides
</commit_message>
<xml_diff>
--- a/SyriaTel Churn Analysis.pptx
+++ b/SyriaTel Churn Analysis.pptx
@@ -5188,7 +5188,7 @@
         <a:p>
           <a:r>
             <a:rPr lang="en-US" dirty="0"/>
-            <a:t>Best Mode</a:t>
+            <a:t>Best Model</a:t>
           </a:r>
         </a:p>
       </dgm:t>
@@ -5196,10 +5196,24 @@
     <dgm:pt modelId="{F535C63A-DD49-694E-84F4-2B44FA4905D5}" type="parTrans" cxnId="{93CA3A5B-6FBD-9349-B54A-DB8D7E070C12}">
       <dgm:prSet/>
       <dgm:spPr/>
+      <dgm:t>
+        <a:bodyPr/>
+        <a:lstStyle/>
+        <a:p>
+          <a:endParaRPr lang="en-US"/>
+        </a:p>
+      </dgm:t>
     </dgm:pt>
     <dgm:pt modelId="{C824D8B0-C1F5-AB41-B2B0-883B973EA36A}" type="sibTrans" cxnId="{93CA3A5B-6FBD-9349-B54A-DB8D7E070C12}">
       <dgm:prSet/>
       <dgm:spPr/>
+      <dgm:t>
+        <a:bodyPr/>
+        <a:lstStyle/>
+        <a:p>
+          <a:endParaRPr lang="en-US"/>
+        </a:p>
+      </dgm:t>
     </dgm:pt>
     <dgm:pt modelId="{92F17074-4815-0F42-9831-8E28C52DBB4C}" type="pres">
       <dgm:prSet presAssocID="{71FC0CE7-48DB-4499-93C3-D3F541AD528A}" presName="hierChild1" presStyleCnt="0">
@@ -7764,7 +7778,7 @@
           </a:pPr>
           <a:r>
             <a:rPr lang="en-US" sz="1400" kern="1200" dirty="0"/>
-            <a:t>Best Mode</a:t>
+            <a:t>Best Model</a:t>
           </a:r>
         </a:p>
       </dsp:txBody>
@@ -19928,7 +19942,7 @@
           <a:p>
             <a:fld id="{23AD794A-17F4-48F7-A14F-39DCAE091952}" type="datetimeFigureOut">
               <a:rPr lang="en-US" smtClean="0"/>
-              <a:t>12/26/21</a:t>
+              <a:t>12/27/21</a:t>
             </a:fld>
             <a:endParaRPr lang="en-US" dirty="0"/>
           </a:p>
@@ -20105,7 +20119,7 @@
           <a:p>
             <a:fld id="{594C6A87-CC60-415C-BFEE-13D1CAD6861A}" type="datetimeFigureOut">
               <a:rPr lang="en-US" smtClean="0"/>
-              <a:t>12/26/21</a:t>
+              <a:t>12/27/21</a:t>
             </a:fld>
             <a:endParaRPr lang="en-US" dirty="0"/>
           </a:p>
@@ -20839,7 +20853,7 @@
           <a:p>
             <a:fld id="{C09CD47A-D6D3-8348-8A2B-0265796DEC16}" type="datetimeFigureOut">
               <a:rPr lang="en-US" smtClean="0"/>
-              <a:t>12/26/21</a:t>
+              <a:t>12/27/21</a:t>
             </a:fld>
             <a:endParaRPr lang="en-US"/>
           </a:p>
@@ -21011,7 +21025,7 @@
           <a:p>
             <a:fld id="{C09CD47A-D6D3-8348-8A2B-0265796DEC16}" type="datetimeFigureOut">
               <a:rPr lang="en-US" smtClean="0"/>
-              <a:t>12/26/21</a:t>
+              <a:t>12/27/21</a:t>
             </a:fld>
             <a:endParaRPr lang="en-US"/>
           </a:p>
@@ -21193,7 +21207,7 @@
           <a:p>
             <a:fld id="{C09CD47A-D6D3-8348-8A2B-0265796DEC16}" type="datetimeFigureOut">
               <a:rPr lang="en-US" smtClean="0"/>
-              <a:t>12/26/21</a:t>
+              <a:t>12/27/21</a:t>
             </a:fld>
             <a:endParaRPr lang="en-US"/>
           </a:p>
@@ -24904,7 +24918,7 @@
           <a:p>
             <a:fld id="{C09CD47A-D6D3-8348-8A2B-0265796DEC16}" type="datetimeFigureOut">
               <a:rPr lang="en-US" smtClean="0"/>
-              <a:t>12/26/21</a:t>
+              <a:t>12/27/21</a:t>
             </a:fld>
             <a:endParaRPr lang="en-US"/>
           </a:p>
@@ -29814,7 +29828,7 @@
           <a:p>
             <a:fld id="{C09CD47A-D6D3-8348-8A2B-0265796DEC16}" type="datetimeFigureOut">
               <a:rPr lang="en-US" smtClean="0"/>
-              <a:t>12/26/21</a:t>
+              <a:t>12/27/21</a:t>
             </a:fld>
             <a:endParaRPr lang="en-US"/>
           </a:p>
@@ -35105,7 +35119,7 @@
           <a:p>
             <a:fld id="{C09CD47A-D6D3-8348-8A2B-0265796DEC16}" type="datetimeFigureOut">
               <a:rPr lang="en-US" smtClean="0"/>
-              <a:t>12/26/21</a:t>
+              <a:t>12/27/21</a:t>
             </a:fld>
             <a:endParaRPr lang="en-US"/>
           </a:p>
@@ -41871,7 +41885,7 @@
           <a:p>
             <a:fld id="{C09CD47A-D6D3-8348-8A2B-0265796DEC16}" type="datetimeFigureOut">
               <a:rPr lang="en-US" smtClean="0"/>
-              <a:t>12/26/21</a:t>
+              <a:t>12/27/21</a:t>
             </a:fld>
             <a:endParaRPr lang="en-US"/>
           </a:p>
@@ -46459,7 +46473,7 @@
           <a:p>
             <a:fld id="{C09CD47A-D6D3-8348-8A2B-0265796DEC16}" type="datetimeFigureOut">
               <a:rPr lang="en-US" smtClean="0"/>
-              <a:t>12/26/21</a:t>
+              <a:t>12/27/21</a:t>
             </a:fld>
             <a:endParaRPr lang="en-US"/>
           </a:p>
@@ -46556,7 +46570,7 @@
           <a:p>
             <a:fld id="{C09CD47A-D6D3-8348-8A2B-0265796DEC16}" type="datetimeFigureOut">
               <a:rPr lang="en-US" smtClean="0"/>
-              <a:t>12/26/21</a:t>
+              <a:t>12/27/21</a:t>
             </a:fld>
             <a:endParaRPr lang="en-US"/>
           </a:p>
@@ -46835,7 +46849,7 @@
           <a:p>
             <a:fld id="{C09CD47A-D6D3-8348-8A2B-0265796DEC16}" type="datetimeFigureOut">
               <a:rPr lang="en-US" smtClean="0"/>
-              <a:t>12/26/21</a:t>
+              <a:t>12/27/21</a:t>
             </a:fld>
             <a:endParaRPr lang="en-US"/>
           </a:p>
@@ -47092,7 +47106,7 @@
           <a:p>
             <a:fld id="{C09CD47A-D6D3-8348-8A2B-0265796DEC16}" type="datetimeFigureOut">
               <a:rPr lang="en-US" smtClean="0"/>
-              <a:t>12/26/21</a:t>
+              <a:t>12/27/21</a:t>
             </a:fld>
             <a:endParaRPr lang="en-US"/>
           </a:p>
@@ -47305,7 +47319,7 @@
           <a:p>
             <a:fld id="{C09CD47A-D6D3-8348-8A2B-0265796DEC16}" type="datetimeFigureOut">
               <a:rPr lang="en-US" smtClean="0"/>
-              <a:t>12/26/21</a:t>
+              <a:t>12/27/21</a:t>
             </a:fld>
             <a:endParaRPr lang="en-US"/>
           </a:p>
@@ -50819,7 +50833,7 @@
           <p:nvPr>
             <p:extLst>
               <p:ext uri="{D42A27DB-BD31-4B8C-83A1-F6EECF244321}">
-                <p14:modId xmlns:p14="http://schemas.microsoft.com/office/powerpoint/2010/main" val="3765929486"/>
+                <p14:modId xmlns:p14="http://schemas.microsoft.com/office/powerpoint/2010/main" val="3103627340"/>
               </p:ext>
             </p:extLst>
           </p:nvPr>
@@ -51427,7 +51441,7 @@
         <p:spPr>
           <a:xfrm>
             <a:off x="881682" y="4602024"/>
-            <a:ext cx="10471355" cy="2031325"/>
+            <a:ext cx="10471355" cy="1754326"/>
           </a:xfrm>
           <a:prstGeom prst="rect">
             <a:avLst/>
@@ -51447,8 +51461,6 @@
               </a:rPr>
               <a:t>NOTES: </a:t>
             </a:r>
-          </a:p>
-          <a:p>
             <a:endParaRPr lang="en-US" dirty="0">
               <a:latin typeface="Arial" panose="020B0604020202020204" pitchFamily="34" charset="0"/>
               <a:cs typeface="Arial" panose="020B0604020202020204" pitchFamily="34" charset="0"/>
@@ -53925,24 +53937,6 @@
 </file>
 
 <file path=customXml/item1.xml><?xml version="1.0" encoding="utf-8"?>
-<?mso-contentType ?>
-<FormTemplates xmlns="http://schemas.microsoft.com/sharepoint/v3/contenttype/forms">
-  <Display>DocumentLibraryForm</Display>
-  <Edit>DocumentLibraryForm</Edit>
-  <New>DocumentLibraryForm</New>
-</FormTemplates>
-</file>
-
-<file path=customXml/item2.xml><?xml version="1.0" encoding="utf-8"?>
-<p:properties xmlns:p="http://schemas.microsoft.com/office/2006/metadata/properties" xmlns:xsi="http://www.w3.org/2001/XMLSchema-instance" xmlns:pc="http://schemas.microsoft.com/office/infopath/2007/PartnerControls">
-  <documentManagement>
-    <Status xmlns="71af3243-3dd4-4a8d-8c0d-dd76da1f02a5">Not started</Status>
-    <MediaServiceKeyPoints xmlns="71af3243-3dd4-4a8d-8c0d-dd76da1f02a5" xsi:nil="true"/>
-  </documentManagement>
-</p:properties>
-</file>
-
-<file path=customXml/item3.xml><?xml version="1.0" encoding="utf-8"?>
 <ct:contentTypeSchema xmlns:ct="http://schemas.microsoft.com/office/2006/metadata/contentType" xmlns:ma="http://schemas.microsoft.com/office/2006/metadata/properties/metaAttributes" ct:_="" ma:_="" ma:contentTypeName="Document" ma:contentTypeID="0x01010079F111ED35F8CC479449609E8A0923A6" ma:contentTypeVersion="12" ma:contentTypeDescription="Create a new document." ma:contentTypeScope="" ma:versionID="46e0ad8bcb937777a496f4378509b82b">
   <xsd:schema xmlns:xsd="http://www.w3.org/2001/XMLSchema" xmlns:xs="http://www.w3.org/2001/XMLSchema" xmlns:p="http://schemas.microsoft.com/office/2006/metadata/properties" xmlns:ns2="71af3243-3dd4-4a8d-8c0d-dd76da1f02a5" xmlns:ns3="16c05727-aa75-4e4a-9b5f-8a80a1165891" targetNamespace="http://schemas.microsoft.com/office/2006/metadata/properties" ma:root="true" ma:fieldsID="3afd91b9dddacb5807afd727ccca0e2e" ns2:_="" ns3:_="">
     <xsd:import namespace="71af3243-3dd4-4a8d-8c0d-dd76da1f02a5"/>
@@ -54163,25 +54157,25 @@
 </ct:contentTypeSchema>
 </file>
 
-<file path=customXml/itemProps1.xml><?xml version="1.0" encoding="utf-8"?>
-<ds:datastoreItem xmlns:ds="http://schemas.openxmlformats.org/officeDocument/2006/customXml" ds:itemID="{185485C0-395C-4142-914B-399C51655AB2}">
-  <ds:schemaRefs>
-    <ds:schemaRef ds:uri="http://schemas.microsoft.com/sharepoint/v3/contenttype/forms"/>
-  </ds:schemaRefs>
-</ds:datastoreItem>
+<file path=customXml/item2.xml><?xml version="1.0" encoding="utf-8"?>
+<p:properties xmlns:p="http://schemas.microsoft.com/office/2006/metadata/properties" xmlns:xsi="http://www.w3.org/2001/XMLSchema-instance" xmlns:pc="http://schemas.microsoft.com/office/infopath/2007/PartnerControls">
+  <documentManagement>
+    <Status xmlns="71af3243-3dd4-4a8d-8c0d-dd76da1f02a5">Not started</Status>
+    <MediaServiceKeyPoints xmlns="71af3243-3dd4-4a8d-8c0d-dd76da1f02a5" xsi:nil="true"/>
+  </documentManagement>
+</p:properties>
 </file>
 
-<file path=customXml/itemProps2.xml><?xml version="1.0" encoding="utf-8"?>
-<ds:datastoreItem xmlns:ds="http://schemas.openxmlformats.org/officeDocument/2006/customXml" ds:itemID="{31D8E205-DB97-4147-A3E5-1A499F975CD4}">
-  <ds:schemaRefs>
-    <ds:schemaRef ds:uri="http://schemas.microsoft.com/office/2006/metadata/properties"/>
-    <ds:schemaRef ds:uri="http://schemas.microsoft.com/office/infopath/2007/PartnerControls"/>
-    <ds:schemaRef ds:uri="71af3243-3dd4-4a8d-8c0d-dd76da1f02a5"/>
-  </ds:schemaRefs>
-</ds:datastoreItem>
+<file path=customXml/item3.xml><?xml version="1.0" encoding="utf-8"?>
+<?mso-contentType ?>
+<FormTemplates xmlns="http://schemas.microsoft.com/sharepoint/v3/contenttype/forms">
+  <Display>DocumentLibraryForm</Display>
+  <Edit>DocumentLibraryForm</Edit>
+  <New>DocumentLibraryForm</New>
+</FormTemplates>
 </file>
 
-<file path=customXml/itemProps3.xml><?xml version="1.0" encoding="utf-8"?>
+<file path=customXml/itemProps1.xml><?xml version="1.0" encoding="utf-8"?>
 <ds:datastoreItem xmlns:ds="http://schemas.openxmlformats.org/officeDocument/2006/customXml" ds:itemID="{466638D1-CCCD-4004-8049-656CFFEFB708}">
   <ds:schemaRefs>
     <ds:schemaRef ds:uri="http://schemas.microsoft.com/office/2006/metadata/contentType"/>
@@ -54198,4 +54192,22 @@
     <ds:schemaRef ds:uri="http://schemas.microsoft.com/internal/obd"/>
   </ds:schemaRefs>
 </ds:datastoreItem>
+</file>
+
+<file path=customXml/itemProps2.xml><?xml version="1.0" encoding="utf-8"?>
+<ds:datastoreItem xmlns:ds="http://schemas.openxmlformats.org/officeDocument/2006/customXml" ds:itemID="{31D8E205-DB97-4147-A3E5-1A499F975CD4}">
+  <ds:schemaRefs>
+    <ds:schemaRef ds:uri="http://schemas.microsoft.com/office/2006/metadata/properties"/>
+    <ds:schemaRef ds:uri="http://schemas.microsoft.com/office/infopath/2007/PartnerControls"/>
+    <ds:schemaRef ds:uri="71af3243-3dd4-4a8d-8c0d-dd76da1f02a5"/>
+  </ds:schemaRefs>
+</ds:datastoreItem>
+</file>
+
+<file path=customXml/itemProps3.xml><?xml version="1.0" encoding="utf-8"?>
+<ds:datastoreItem xmlns:ds="http://schemas.openxmlformats.org/officeDocument/2006/customXml" ds:itemID="{185485C0-395C-4142-914B-399C51655AB2}">
+  <ds:schemaRefs>
+    <ds:schemaRef ds:uri="http://schemas.microsoft.com/sharepoint/v3/contenttype/forms"/>
+  </ds:schemaRefs>
+</ds:datastoreItem>
 </file>
</xml_diff>